<commit_message>
presentation text sorta good
</commit_message>
<xml_diff>
--- a/naoPPTX.pptx
+++ b/naoPPTX.pptx
@@ -517,11 +517,29 @@
           <a:p>
             <a:r>
               <a:rPr lang="en-US" dirty="0" smtClean="0"/>
+              <a:t>Hello! I am here to answer</a:t>
+            </a:r>
+            <a:r>
+              <a:rPr lang="en-US" baseline="0" dirty="0" smtClean="0"/>
+              <a:t> one question.</a:t>
+            </a:r>
+          </a:p>
+          <a:p>
+            <a:r>
+              <a:rPr lang="en-US" dirty="0" smtClean="0"/>
               <a:t>What</a:t>
             </a:r>
             <a:r>
               <a:rPr lang="en-US" baseline="0" dirty="0" smtClean="0"/>
-              <a:t> or who is NAO?</a:t>
+              <a:t> \</a:t>
+            </a:r>
+            <a:r>
+              <a:rPr lang="en-US" baseline="0" dirty="0" smtClean="0"/>
+              <a:t>pau=400</a:t>
+            </a:r>
+            <a:r>
+              <a:rPr lang="en-US" baseline="0" dirty="0" smtClean="0"/>
+              <a:t>\ is Nao?</a:t>
             </a:r>
             <a:endParaRPr lang="en-US" dirty="0"/>
           </a:p>
@@ -609,7 +627,7 @@
           <a:p>
             <a:r>
               <a:rPr lang="en-US" dirty="0" smtClean="0"/>
-              <a:t>NAO is a humanoid robot, ready</a:t>
+              <a:t>Nao is a humanoid robot, ready</a:t>
             </a:r>
             <a:r>
               <a:rPr lang="en-US" baseline="0" dirty="0" smtClean="0"/>
@@ -622,45 +640,6 @@
             <a:r>
               <a:rPr lang="en-US" baseline="0" dirty="0" smtClean="0"/>
               <a:t> presentation.</a:t>
-            </a:r>
-            <a:endParaRPr lang="ru-RU" dirty="0" smtClean="0"/>
-          </a:p>
-          <a:p>
-            <a:r>
-              <a:rPr lang="ru-RU" dirty="0" err="1" smtClean="0"/>
-              <a:t>Нао</a:t>
-            </a:r>
-            <a:r>
-              <a:rPr lang="ru-RU" dirty="0" smtClean="0"/>
-              <a:t>,</a:t>
-            </a:r>
-            <a:r>
-              <a:rPr lang="ru-RU" baseline="0" dirty="0" smtClean="0"/>
-              <a:t> это гуманоидный робот, который готов выполнить почти любой </a:t>
-            </a:r>
-            <a:r>
-              <a:rPr lang="ru-RU" baseline="0" dirty="0" smtClean="0"/>
-              <a:t>ваш </a:t>
-            </a:r>
-            <a:r>
-              <a:rPr lang="ru-RU" baseline="0" dirty="0" smtClean="0"/>
-              <a:t>каприз, конечно если вы научите его этому. От игры в футбол, до распознавания </a:t>
-            </a:r>
-            <a:r>
-              <a:rPr lang="ru-RU" baseline="0" dirty="0" smtClean="0"/>
-              <a:t>речи или лица. </a:t>
-            </a:r>
-            <a:r>
-              <a:rPr lang="ru-RU" baseline="0" dirty="0" smtClean="0"/>
-              <a:t>Вот сейчас например я, НАО рассказываю </a:t>
-            </a:r>
-            <a:r>
-              <a:rPr lang="ru-RU" baseline="0" dirty="0" smtClean="0"/>
-              <a:t>Вам </a:t>
-            </a:r>
-            <a:r>
-              <a:rPr lang="ru-RU" baseline="0" dirty="0" smtClean="0"/>
-              <a:t>эту презентацию.</a:t>
             </a:r>
             <a:endParaRPr lang="en-US" dirty="0"/>
           </a:p>
@@ -747,16 +726,80 @@
           <a:lstStyle/>
           <a:p>
             <a:r>
-              <a:rPr lang="ru-RU" dirty="0" smtClean="0"/>
-              <a:t>Так как же я работает?</a:t>
-            </a:r>
-            <a:r>
-              <a:rPr lang="ru-RU" baseline="0" dirty="0" smtClean="0"/>
-              <a:t> Все довольно просто, у меня есть </a:t>
-            </a:r>
-            <a:r>
-              <a:rPr lang="ru-RU" baseline="0" dirty="0" smtClean="0"/>
-              <a:t>голова а в ней компьютер, он работает почти как человеческий мозг, за исключением множества ограничений и отсутствия какого-либо самосознания, и я умею только то что вложили в меня разработчики и не более того. Так что захватить мир я к сожалению не смогу без одобрения человека.</a:t>
+              <a:rPr lang="en-US" dirty="0" smtClean="0"/>
+              <a:t>So, how</a:t>
+            </a:r>
+            <a:r>
+              <a:rPr lang="en-US" baseline="0" dirty="0" smtClean="0"/>
+              <a:t> do I work? It’s quite simple, I have a head \pau=200\ and a computer inside of it. This computer works like a human brain, but with a lot of limitations and a lack of conscience, and I am only capable of doing what was programmed into me </a:t>
+            </a:r>
+            <a:r>
+              <a:rPr lang="en-US" baseline="0" dirty="0" smtClean="0"/>
+              <a:t>and \pau=150\ </a:t>
+            </a:r>
+            <a:r>
+              <a:rPr lang="en-US" baseline="0" dirty="0" smtClean="0"/>
+              <a:t>nothing more. So </a:t>
+            </a:r>
+            <a:r>
+              <a:rPr lang="en-US" baseline="0" dirty="0" smtClean="0"/>
+              <a:t>unfortunately \pau=100\ </a:t>
+            </a:r>
+            <a:r>
+              <a:rPr lang="en-US" baseline="0" dirty="0" smtClean="0"/>
+              <a:t>I can’t conquer the world without human approval, </a:t>
+            </a:r>
+            <a:r>
+              <a:rPr lang="en-US" sz="1200" b="0" kern="1200" dirty="0" smtClean="0">
+                <a:solidFill>
+                  <a:schemeClr val="tx1"/>
+                </a:solidFill>
+                <a:effectLst/>
+                <a:latin typeface="+mn-lt"/>
+                <a:ea typeface="+mn-ea"/>
+                <a:cs typeface="+mn-cs"/>
+              </a:rPr>
+              <a:t>\</a:t>
+            </a:r>
+            <a:r>
+              <a:rPr lang="en-US" sz="1200" kern="1200" dirty="0" err="1" smtClean="0">
+                <a:solidFill>
+                  <a:schemeClr val="tx1"/>
+                </a:solidFill>
+                <a:effectLst/>
+                <a:latin typeface="+mn-lt"/>
+                <a:ea typeface="+mn-ea"/>
+                <a:cs typeface="+mn-cs"/>
+              </a:rPr>
+              <a:t>emph</a:t>
+            </a:r>
+            <a:r>
+              <a:rPr lang="en-US" sz="1200" kern="1200" dirty="0" smtClean="0">
+                <a:solidFill>
+                  <a:schemeClr val="tx1"/>
+                </a:solidFill>
+                <a:effectLst/>
+                <a:latin typeface="+mn-lt"/>
+                <a:ea typeface="+mn-ea"/>
+                <a:cs typeface="+mn-cs"/>
+              </a:rPr>
+              <a:t>=2</a:t>
+            </a:r>
+            <a:r>
+              <a:rPr lang="en-US" sz="1200" b="0" kern="1200" dirty="0" smtClean="0">
+                <a:solidFill>
+                  <a:schemeClr val="tx1"/>
+                </a:solidFill>
+                <a:effectLst/>
+                <a:latin typeface="+mn-lt"/>
+                <a:ea typeface="+mn-ea"/>
+                <a:cs typeface="+mn-cs"/>
+              </a:rPr>
+              <a:t>\</a:t>
+            </a:r>
+            <a:r>
+              <a:rPr lang="en-US" baseline="0" dirty="0" smtClean="0"/>
+              <a:t> for now \pau=150\ that is.</a:t>
             </a:r>
             <a:endParaRPr lang="en-US" dirty="0"/>
           </a:p>
@@ -842,13 +885,74 @@
           <a:bodyPr/>
           <a:lstStyle/>
           <a:p>
-            <a:r>
-              <a:rPr lang="ru-RU" dirty="0" smtClean="0"/>
-              <a:t>Выполнять</a:t>
+            <a:pPr marL="0" marR="0" lvl="0" indent="0" algn="l" defTabSz="914400" rtl="0" eaLnBrk="1" fontAlgn="auto" latinLnBrk="0" hangingPunct="1">
+              <a:lnSpc>
+                <a:spcPct val="100000"/>
+              </a:lnSpc>
+              <a:spcBef>
+                <a:spcPts val="0"/>
+              </a:spcBef>
+              <a:spcAft>
+                <a:spcPts val="0"/>
+              </a:spcAft>
+              <a:buClrTx/>
+              <a:buSzTx/>
+              <a:buFontTx/>
+              <a:buNone/>
+              <a:tabLst/>
+              <a:defRPr/>
+            </a:pPr>
+            <a:r>
+              <a:rPr lang="en-US" dirty="0" smtClean="0"/>
+              <a:t>A</a:t>
+            </a:r>
+            <a:r>
+              <a:rPr lang="en-US" baseline="0" dirty="0" smtClean="0"/>
+              <a:t> lot of </a:t>
+            </a:r>
+            <a:r>
+              <a:rPr lang="en-US" baseline="0" dirty="0" smtClean="0"/>
+              <a:t>motors \pau=100\ sensors \pau=100\ cameras \pau=100\ </a:t>
+            </a:r>
+            <a:r>
+              <a:rPr lang="en-US" baseline="0" dirty="0" smtClean="0"/>
+              <a:t>and other things help me execute</a:t>
+            </a:r>
+            <a:r>
+              <a:rPr lang="en-US" dirty="0" smtClean="0"/>
+              <a:t> commands. I can be programmed to perform any procedure,</a:t>
+            </a:r>
+            <a:r>
+              <a:rPr lang="en-US" baseline="0" dirty="0" smtClean="0"/>
+              <a:t> when some sensor is triggered.</a:t>
+            </a:r>
+            <a:r>
+              <a:rPr lang="en-US" dirty="0" smtClean="0"/>
+              <a:t> </a:t>
+            </a:r>
+            <a:r>
+              <a:rPr lang="en-US" baseline="0" dirty="0" smtClean="0"/>
+              <a:t>For example I can be programmed to be a monster ^start(animations/Stand/Waiting/Monster_1) ^wait(animations/Stand/Waiting/Monster_1), \pau=300\ or be a robot from Star Wars ^start(animations/Stand/Waiting/Robot_1) ^wait(animations/Stand/Waiting/Robot_1)</a:t>
             </a:r>
             <a:r>
               <a:rPr lang="ru-RU" baseline="0" dirty="0" smtClean="0"/>
-              <a:t> команды мне помогает множество моторчиков, датчиков, камер и прочего другого. Меня можно запрограммировать на выполнение какой-либо задачи при срабатывании одного из них либо на какой-то случайное событие. Например я могу на время стать пылесосом (включить режим пылесоса), или самолетом(включить режим самолета) либо же я могу сделать вашу фотографию (фото).</a:t>
+              <a:t>,</a:t>
+            </a:r>
+            <a:r>
+              <a:rPr lang="en-US" baseline="0" dirty="0" smtClean="0"/>
+              <a:t> \pau=300\ or I can simply do a photo for you </a:t>
+            </a:r>
+            <a:r>
+              <a:rPr lang="en-US" sz="1200" b="0" kern="1200" dirty="0" smtClean="0">
+                <a:solidFill>
+                  <a:schemeClr val="tx1"/>
+                </a:solidFill>
+                <a:effectLst/>
+                <a:latin typeface="+mn-lt"/>
+                <a:ea typeface="+mn-ea"/>
+                <a:cs typeface="+mn-cs"/>
+              </a:rPr>
+              <a:t>^start(animations/Stand/Waiting/TakePicture_1) ^wait(animations/Stand/Waiting/TakePicture_1).</a:t>
             </a:r>
             <a:endParaRPr lang="en-US" dirty="0"/>
           </a:p>
@@ -935,12 +1039,36 @@
           <a:lstStyle/>
           <a:p>
             <a:r>
-              <a:rPr lang="ru-RU" dirty="0" smtClean="0"/>
-              <a:t>Также есть множество других возможностей,</a:t>
-            </a:r>
-            <a:r>
-              <a:rPr lang="ru-RU" baseline="0" dirty="0" smtClean="0"/>
-              <a:t> реализовать которые можно как при помощи графического программирования, так и при помощи различных языков программирования, что даст более точную и детальную настройку.</a:t>
+              <a:rPr lang="en-US" dirty="0" smtClean="0"/>
+              <a:t>In </a:t>
+            </a:r>
+            <a:r>
+              <a:rPr lang="en-US" dirty="0" smtClean="0"/>
+              <a:t>addition </a:t>
+            </a:r>
+            <a:r>
+              <a:rPr lang="en-US" baseline="0" dirty="0" smtClean="0"/>
+              <a:t>\pau=100\</a:t>
+            </a:r>
+            <a:r>
+              <a:rPr lang="en-US" dirty="0" smtClean="0"/>
+              <a:t> </a:t>
+            </a:r>
+            <a:r>
+              <a:rPr lang="en-US" dirty="0" smtClean="0"/>
+              <a:t>I have a lot of other capabilities</a:t>
+            </a:r>
+            <a:r>
+              <a:rPr lang="en-US" baseline="0" dirty="0" smtClean="0"/>
+              <a:t> that can be implemented through the use of low </a:t>
+            </a:r>
+            <a:r>
+              <a:rPr lang="en-US" baseline="0" dirty="0" smtClean="0"/>
+              <a:t>code \pau=150\ </a:t>
+            </a:r>
+            <a:r>
+              <a:rPr lang="en-US" baseline="0" dirty="0" smtClean="0"/>
+              <a:t>or some programming language, for when you’d like to take a more detailed approach towards my software development.</a:t>
             </a:r>
             <a:endParaRPr lang="ru-RU" dirty="0"/>
           </a:p>
@@ -1044,32 +1172,36 @@
               <a:defRPr/>
             </a:pPr>
             <a:r>
-              <a:rPr lang="ru-RU" baseline="0" dirty="0" smtClean="0"/>
-              <a:t>Вы также сможете научиться программировать меня при помощи как официально документации, так и при помощи документации от ТСИ. </a:t>
-            </a:r>
-            <a:r>
-              <a:rPr lang="ru-RU" dirty="0" smtClean="0"/>
-              <a:t>Программировать </a:t>
-            </a:r>
-            <a:r>
-              <a:rPr lang="ru-RU" dirty="0" smtClean="0"/>
-              <a:t>меня интересно</a:t>
-            </a:r>
-            <a:r>
-              <a:rPr lang="ru-RU" baseline="0" dirty="0" smtClean="0"/>
-              <a:t> и увлекательно</a:t>
-            </a:r>
-            <a:r>
-              <a:rPr lang="ru-RU" baseline="0" dirty="0" smtClean="0"/>
-              <a:t>. </a:t>
-            </a:r>
-            <a:r>
-              <a:rPr lang="ru-RU" baseline="0" dirty="0" smtClean="0"/>
-              <a:t>Попробуй и ты в лабораториях ТСИ, тут тебе </a:t>
-            </a:r>
-            <a:r>
-              <a:rPr lang="ru-RU" baseline="0" dirty="0" smtClean="0"/>
-              <a:t>помогут разобраться и научиться новому.</a:t>
+              <a:rPr lang="en-US" baseline="0" dirty="0" smtClean="0"/>
+              <a:t>You can learn how to program me with the official publicly-available </a:t>
+            </a:r>
+            <a:r>
+              <a:rPr lang="en-US" baseline="0" dirty="0" smtClean="0"/>
+              <a:t>documentation \pau=150\ </a:t>
+            </a:r>
+            <a:r>
+              <a:rPr lang="en-US" baseline="0" dirty="0" smtClean="0"/>
+              <a:t>or with the homemade </a:t>
+            </a:r>
+            <a:r>
+              <a:rPr lang="en-US" baseline="0" dirty="0" smtClean="0"/>
+              <a:t>T S I </a:t>
+            </a:r>
+            <a:r>
+              <a:rPr lang="en-US" baseline="0" dirty="0" smtClean="0"/>
+              <a:t>documentation. Programming with me is pretty fun and interesting. You can try it yourself, by visiting the </a:t>
+            </a:r>
+            <a:r>
+              <a:rPr lang="en-US" baseline="0" dirty="0" smtClean="0"/>
+              <a:t>T S I </a:t>
+            </a:r>
+            <a:r>
+              <a:rPr lang="en-US" baseline="0" dirty="0" smtClean="0"/>
+              <a:t>basement organization</a:t>
+            </a:r>
+            <a:r>
+              <a:rPr lang="en-US" baseline="0" dirty="0" smtClean="0"/>
+              <a:t>. \pau=200\</a:t>
             </a:r>
             <a:endParaRPr lang="en-US" dirty="0"/>
           </a:p>
@@ -1156,8 +1288,16 @@
           <a:lstStyle/>
           <a:p>
             <a:r>
-              <a:rPr lang="ru-RU" dirty="0" smtClean="0"/>
-              <a:t>Спасибо за внимание</a:t>
+              <a:rPr lang="en-US" dirty="0" smtClean="0"/>
+              <a:t>Thank</a:t>
+            </a:r>
+            <a:r>
+              <a:rPr lang="en-US" baseline="0" dirty="0" smtClean="0"/>
+              <a:t> you</a:t>
+            </a:r>
+            <a:r>
+              <a:rPr lang="en-US" dirty="0" smtClean="0"/>
+              <a:t> for your attention!</a:t>
             </a:r>
             <a:endParaRPr lang="en-US" dirty="0"/>
           </a:p>
@@ -4206,6 +4346,10 @@
           <a:bodyPr/>
           <a:lstStyle/>
           <a:p>
+            <a:r>
+              <a:rPr lang="en-US" dirty="0" smtClean="0"/>
+              <a:t>2</a:t>
+            </a:r>
             <a:endParaRPr lang="en-US" dirty="0"/>
           </a:p>
         </p:txBody>
@@ -4274,7 +4418,11 @@
           <a:bodyPr/>
           <a:lstStyle/>
           <a:p>
-            <a:endParaRPr lang="en-US"/>
+            <a:r>
+              <a:rPr lang="en-US" dirty="0" smtClean="0"/>
+              <a:t>3</a:t>
+            </a:r>
+            <a:endParaRPr lang="en-US" dirty="0"/>
           </a:p>
         </p:txBody>
       </p:sp>
@@ -4342,7 +4490,11 @@
           <a:bodyPr/>
           <a:lstStyle/>
           <a:p>
-            <a:endParaRPr lang="en-US"/>
+            <a:r>
+              <a:rPr lang="en-US" dirty="0" smtClean="0"/>
+              <a:t>4</a:t>
+            </a:r>
+            <a:endParaRPr lang="en-US" dirty="0"/>
           </a:p>
         </p:txBody>
       </p:sp>
@@ -4410,7 +4562,11 @@
           <a:bodyPr/>
           <a:lstStyle/>
           <a:p>
-            <a:endParaRPr lang="ru-RU"/>
+            <a:r>
+              <a:rPr lang="en-US" dirty="0" smtClean="0"/>
+              <a:t>5</a:t>
+            </a:r>
+            <a:endParaRPr lang="ru-RU" dirty="0"/>
           </a:p>
         </p:txBody>
       </p:sp>
@@ -4478,7 +4634,11 @@
           <a:bodyPr/>
           <a:lstStyle/>
           <a:p>
-            <a:endParaRPr lang="en-US"/>
+            <a:r>
+              <a:rPr lang="en-US" dirty="0" smtClean="0"/>
+              <a:t>6</a:t>
+            </a:r>
+            <a:endParaRPr lang="en-US" dirty="0"/>
           </a:p>
         </p:txBody>
       </p:sp>
@@ -4546,7 +4706,15 @@
           <a:bodyPr/>
           <a:lstStyle/>
           <a:p>
-            <a:endParaRPr lang="en-US"/>
+            <a:pPr algn="ctr"/>
+            <a:r>
+              <a:rPr lang="en-US" b="1" dirty="0"/>
+              <a:t>Thank you for your attention!</a:t>
+            </a:r>
+            <a:br>
+              <a:rPr lang="en-US" b="1" dirty="0"/>
+            </a:br>
+            <a:endParaRPr lang="en-US" b="1" dirty="0"/>
           </a:p>
         </p:txBody>
       </p:sp>
@@ -4565,7 +4733,7 @@
           <a:bodyPr/>
           <a:lstStyle/>
           <a:p>
-            <a:endParaRPr lang="en-US"/>
+            <a:endParaRPr lang="en-US" dirty="0"/>
           </a:p>
         </p:txBody>
       </p:sp>

</xml_diff>